<commit_message>
angular Login web api
</commit_message>
<xml_diff>
--- a/LTI_RDBMS/RDBMS.pptx
+++ b/LTI_RDBMS/RDBMS.pptx
@@ -5,7 +5,7 @@
     <p:sldMasterId id="2147483840" r:id="rId1"/>
   </p:sldMasterIdLst>
   <p:notesMasterIdLst>
-    <p:notesMasterId r:id="rId68"/>
+    <p:notesMasterId r:id="rId69"/>
   </p:notesMasterIdLst>
   <p:sldIdLst>
     <p:sldId id="256" r:id="rId2"/>
@@ -61,19 +61,20 @@
     <p:sldId id="324" r:id="rId52"/>
     <p:sldId id="325" r:id="rId53"/>
     <p:sldId id="326" r:id="rId54"/>
-    <p:sldId id="319" r:id="rId55"/>
-    <p:sldId id="281" r:id="rId56"/>
-    <p:sldId id="282" r:id="rId57"/>
-    <p:sldId id="283" r:id="rId58"/>
-    <p:sldId id="284" r:id="rId59"/>
-    <p:sldId id="285" r:id="rId60"/>
-    <p:sldId id="286" r:id="rId61"/>
-    <p:sldId id="287" r:id="rId62"/>
-    <p:sldId id="288" r:id="rId63"/>
-    <p:sldId id="289" r:id="rId64"/>
-    <p:sldId id="280" r:id="rId65"/>
-    <p:sldId id="327" r:id="rId66"/>
-    <p:sldId id="259" r:id="rId67"/>
+    <p:sldId id="328" r:id="rId55"/>
+    <p:sldId id="319" r:id="rId56"/>
+    <p:sldId id="281" r:id="rId57"/>
+    <p:sldId id="282" r:id="rId58"/>
+    <p:sldId id="283" r:id="rId59"/>
+    <p:sldId id="284" r:id="rId60"/>
+    <p:sldId id="285" r:id="rId61"/>
+    <p:sldId id="286" r:id="rId62"/>
+    <p:sldId id="287" r:id="rId63"/>
+    <p:sldId id="288" r:id="rId64"/>
+    <p:sldId id="289" r:id="rId65"/>
+    <p:sldId id="280" r:id="rId66"/>
+    <p:sldId id="327" r:id="rId67"/>
+    <p:sldId id="259" r:id="rId68"/>
   </p:sldIdLst>
   <p:sldSz cx="12192000" cy="6858000"/>
   <p:notesSz cx="6858000" cy="9144000"/>
@@ -263,7 +264,7 @@
             <a:fld id="{5BE311DA-4B78-415A-8C6F-8FB7CBF1EA36}" type="datetimeFigureOut">
               <a:rPr lang="en-IN" smtClean="0"/>
               <a:pPr/>
-              <a:t>18/10/2023</a:t>
+              <a:t>28/08/2024</a:t>
             </a:fld>
             <a:endParaRPr lang="en-IN"/>
           </a:p>
@@ -727,7 +728,7 @@
             <a:fld id="{D2474CCF-98B4-411A-8810-C31E8C29E19B}" type="datetimeFigureOut">
               <a:rPr lang="en-US" smtClean="0"/>
               <a:pPr/>
-              <a:t>10/18/2023</a:t>
+              <a:t>8/28/2024</a:t>
             </a:fld>
             <a:endParaRPr lang="en-US"/>
           </a:p>
@@ -1082,7 +1083,7 @@
             <a:fld id="{D2474CCF-98B4-411A-8810-C31E8C29E19B}" type="datetimeFigureOut">
               <a:rPr lang="en-US" smtClean="0"/>
               <a:pPr/>
-              <a:t>10/18/2023</a:t>
+              <a:t>8/28/2024</a:t>
             </a:fld>
             <a:endParaRPr lang="en-US"/>
           </a:p>
@@ -1259,7 +1260,7 @@
             <a:fld id="{D2474CCF-98B4-411A-8810-C31E8C29E19B}" type="datetimeFigureOut">
               <a:rPr lang="en-US" smtClean="0"/>
               <a:pPr/>
-              <a:t>10/18/2023</a:t>
+              <a:t>8/28/2024</a:t>
             </a:fld>
             <a:endParaRPr lang="en-US"/>
           </a:p>
@@ -1374,7 +1375,7 @@
             <a:fld id="{D2474CCF-98B4-411A-8810-C31E8C29E19B}" type="datetimeFigureOut">
               <a:rPr lang="en-US" smtClean="0"/>
               <a:pPr/>
-              <a:t>10/18/2023</a:t>
+              <a:t>8/28/2024</a:t>
             </a:fld>
             <a:endParaRPr lang="en-US"/>
           </a:p>
@@ -1734,7 +1735,7 @@
             <a:fld id="{D2474CCF-98B4-411A-8810-C31E8C29E19B}" type="datetimeFigureOut">
               <a:rPr lang="en-US" smtClean="0"/>
               <a:pPr/>
-              <a:t>10/18/2023</a:t>
+              <a:t>8/28/2024</a:t>
             </a:fld>
             <a:endParaRPr lang="en-US"/>
           </a:p>
@@ -2001,7 +2002,7 @@
             <a:fld id="{D2474CCF-98B4-411A-8810-C31E8C29E19B}" type="datetimeFigureOut">
               <a:rPr lang="en-US" smtClean="0"/>
               <a:pPr/>
-              <a:t>10/18/2023</a:t>
+              <a:t>8/28/2024</a:t>
             </a:fld>
             <a:endParaRPr lang="en-US"/>
           </a:p>
@@ -2365,7 +2366,7 @@
             <a:fld id="{D2474CCF-98B4-411A-8810-C31E8C29E19B}" type="datetimeFigureOut">
               <a:rPr lang="en-US" smtClean="0"/>
               <a:pPr/>
-              <a:t>10/18/2023</a:t>
+              <a:t>8/28/2024</a:t>
             </a:fld>
             <a:endParaRPr lang="en-US"/>
           </a:p>
@@ -2594,7 +2595,7 @@
             <a:fld id="{D2474CCF-98B4-411A-8810-C31E8C29E19B}" type="datetimeFigureOut">
               <a:rPr lang="en-US" smtClean="0"/>
               <a:pPr/>
-              <a:t>10/18/2023</a:t>
+              <a:t>8/28/2024</a:t>
             </a:fld>
             <a:endParaRPr lang="en-US"/>
           </a:p>
@@ -2686,7 +2687,7 @@
             <a:fld id="{D2474CCF-98B4-411A-8810-C31E8C29E19B}" type="datetimeFigureOut">
               <a:rPr lang="en-US" smtClean="0"/>
               <a:pPr/>
-              <a:t>10/18/2023</a:t>
+              <a:t>8/28/2024</a:t>
             </a:fld>
             <a:endParaRPr lang="en-US"/>
           </a:p>
@@ -2955,7 +2956,7 @@
             <a:fld id="{D2474CCF-98B4-411A-8810-C31E8C29E19B}" type="datetimeFigureOut">
               <a:rPr lang="en-US" smtClean="0"/>
               <a:pPr/>
-              <a:t>10/18/2023</a:t>
+              <a:t>8/28/2024</a:t>
             </a:fld>
             <a:endParaRPr lang="en-US"/>
           </a:p>
@@ -3185,7 +3186,7 @@
             <a:fld id="{D2474CCF-98B4-411A-8810-C31E8C29E19B}" type="datetimeFigureOut">
               <a:rPr lang="en-US" smtClean="0"/>
               <a:pPr/>
-              <a:t>10/18/2023</a:t>
+              <a:t>8/28/2024</a:t>
             </a:fld>
             <a:endParaRPr lang="en-US"/>
           </a:p>
@@ -3686,7 +3687,7 @@
             <a:fld id="{D2474CCF-98B4-411A-8810-C31E8C29E19B}" type="datetimeFigureOut">
               <a:rPr lang="en-US" smtClean="0"/>
               <a:pPr/>
-              <a:t>10/18/2023</a:t>
+              <a:t>8/28/2024</a:t>
             </a:fld>
             <a:endParaRPr lang="en-US"/>
           </a:p>
@@ -5714,7 +5715,12 @@
             <p:ph type="title"/>
           </p:nvPr>
         </p:nvSpPr>
-        <p:spPr/>
+        <p:spPr>
+          <a:xfrm>
+            <a:off x="1200150" y="446088"/>
+            <a:ext cx="10363200" cy="1143000"/>
+          </a:xfrm>
+        </p:spPr>
         <p:txBody>
           <a:bodyPr>
             <a:normAutofit fontScale="90000"/>
@@ -5758,7 +5764,7 @@
         </p:nvSpPr>
         <p:spPr>
           <a:xfrm>
-            <a:off x="1016876" y="1200494"/>
+            <a:off x="1064501" y="1533869"/>
             <a:ext cx="9167648" cy="1938992"/>
           </a:xfrm>
           <a:prstGeom prst="rect">
@@ -5864,7 +5870,7 @@
         </p:nvSpPr>
         <p:spPr>
           <a:xfrm>
-            <a:off x="1016876" y="3190025"/>
+            <a:off x="997826" y="3980600"/>
             <a:ext cx="9301655" cy="1569660"/>
           </a:xfrm>
           <a:prstGeom prst="rect">
@@ -6486,8 +6492,8 @@
         </p:nvSpPr>
         <p:spPr>
           <a:xfrm>
-            <a:off x="838200" y="501761"/>
-            <a:ext cx="10515600" cy="349578"/>
+            <a:off x="838200" y="501760"/>
+            <a:ext cx="3352800" cy="862219"/>
           </a:xfrm>
         </p:spPr>
         <p:txBody>
@@ -6497,7 +6503,7 @@
           <a:lstStyle/>
           <a:p>
             <a:r>
-              <a:rPr lang="en-IN" sz="4000" b="0" i="0" dirty="0">
+              <a:rPr lang="en-IN" sz="2200" b="1" i="0" dirty="0">
                 <a:solidFill>
                   <a:srgbClr val="212529"/>
                 </a:solidFill>
@@ -7662,7 +7668,7 @@
         <p:spPr>
           <a:xfrm>
             <a:off x="735724" y="2039458"/>
-            <a:ext cx="6096000" cy="1754326"/>
+            <a:ext cx="7150976" cy="1754326"/>
           </a:xfrm>
           <a:prstGeom prst="rect">
             <a:avLst/>
@@ -9960,11 +9966,14 @@
                     <a:p>
                       <a:pPr algn="l"/>
                       <a:r>
-                        <a:rPr lang="en-IN">
+                        <a:rPr lang="en-IN" dirty="0" err="1">
                           <a:effectLst/>
                         </a:rPr>
                         <a:t>subject_id</a:t>
                       </a:r>
+                      <a:endParaRPr lang="en-IN" dirty="0">
+                        <a:effectLst/>
+                      </a:endParaRPr>
                     </a:p>
                   </a:txBody>
                   <a:tcPr>
@@ -10016,11 +10025,14 @@
                     <a:p>
                       <a:pPr algn="l"/>
                       <a:r>
-                        <a:rPr lang="en-IN">
+                        <a:rPr lang="en-IN" dirty="0" err="1">
                           <a:effectLst/>
                         </a:rPr>
                         <a:t>subject_name</a:t>
                       </a:r>
+                      <a:endParaRPr lang="en-IN" dirty="0">
+                        <a:effectLst/>
+                      </a:endParaRPr>
                     </a:p>
                   </a:txBody>
                   <a:tcPr>
@@ -10072,7 +10084,7 @@
                     <a:p>
                       <a:pPr algn="l"/>
                       <a:r>
-                        <a:rPr lang="en-IN">
+                        <a:rPr lang="en-IN" dirty="0">
                           <a:effectLst/>
                         </a:rPr>
                         <a:t>teacher</a:t>
@@ -10761,11 +10773,14 @@
                     <a:p>
                       <a:pPr algn="l"/>
                       <a:r>
-                        <a:rPr lang="en-IN">
+                        <a:rPr lang="en-IN" dirty="0" err="1">
                           <a:effectLst/>
                         </a:rPr>
                         <a:t>score_id</a:t>
                       </a:r>
+                      <a:endParaRPr lang="en-IN" dirty="0">
+                        <a:effectLst/>
+                      </a:endParaRPr>
                     </a:p>
                   </a:txBody>
                   <a:tcPr>
@@ -11101,7 +11116,7 @@
                     <a:lstStyle/>
                     <a:p>
                       <a:r>
-                        <a:rPr lang="en-IN">
+                        <a:rPr lang="en-IN" dirty="0">
                           <a:effectLst/>
                         </a:rPr>
                         <a:t>1</a:t>
@@ -11717,7 +11732,9 @@
         </p:nvSpPr>
         <p:spPr/>
         <p:txBody>
-          <a:bodyPr/>
+          <a:bodyPr>
+            <a:normAutofit fontScale="90000"/>
+          </a:bodyPr>
           <a:lstStyle/>
           <a:p>
             <a:r>
@@ -13458,7 +13475,9 @@
         </p:nvSpPr>
         <p:spPr/>
         <p:txBody>
-          <a:bodyPr/>
+          <a:bodyPr>
+            <a:normAutofit fontScale="90000"/>
+          </a:bodyPr>
           <a:lstStyle/>
           <a:p>
             <a:r>
@@ -13713,7 +13732,9 @@
         </p:nvSpPr>
         <p:spPr/>
         <p:txBody>
-          <a:bodyPr/>
+          <a:bodyPr>
+            <a:normAutofit fontScale="90000"/>
+          </a:bodyPr>
           <a:lstStyle/>
           <a:p>
             <a:r>
@@ -14651,7 +14672,12 @@
             <p:ph type="title"/>
           </p:nvPr>
         </p:nvSpPr>
-        <p:spPr/>
+        <p:spPr>
+          <a:xfrm>
+            <a:off x="1219200" y="274638"/>
+            <a:ext cx="5334000" cy="1439862"/>
+          </a:xfrm>
+        </p:spPr>
         <p:txBody>
           <a:bodyPr>
             <a:normAutofit fontScale="90000"/>
@@ -14659,7 +14685,7 @@
           <a:lstStyle/>
           <a:p>
             <a:r>
-              <a:rPr lang="en-IN" b="0" i="0" dirty="0">
+              <a:rPr lang="en-IN" sz="2700" b="0" i="0" dirty="0">
                 <a:solidFill>
                   <a:srgbClr val="212529"/>
                 </a:solidFill>
@@ -14669,7 +14695,7 @@
               <a:t>Boyce-Codd Normal Form (BCNF)</a:t>
             </a:r>
             <a:br>
-              <a:rPr lang="en-IN" b="0" i="0" dirty="0">
+              <a:rPr lang="en-IN" sz="2700" b="0" i="0" dirty="0">
                 <a:solidFill>
                   <a:srgbClr val="212529"/>
                 </a:solidFill>
@@ -21668,22 +21694,22 @@
           </p:nvPr>
         </p:nvGraphicFramePr>
         <p:xfrm>
-          <a:off x="693488" y="5343784"/>
-          <a:ext cx="5696995" cy="914400"/>
+          <a:off x="716348" y="5084704"/>
+          <a:ext cx="7604692" cy="914400"/>
         </p:xfrm>
         <a:graphic>
           <a:graphicData uri="http://schemas.openxmlformats.org/drawingml/2006/table">
             <a:tbl>
               <a:tblPr/>
               <a:tblGrid>
-                <a:gridCol w="397666">
+                <a:gridCol w="530829">
                   <a:extLst>
                     <a:ext uri="{9D8B030D-6E8A-4147-A177-3AD203B41FA5}">
                       <a16:colId xmlns="" xmlns:a16="http://schemas.microsoft.com/office/drawing/2014/main" val="995393975"/>
                     </a:ext>
                   </a:extLst>
                 </a:gridCol>
-                <a:gridCol w="5299329">
+                <a:gridCol w="7073863">
                   <a:extLst>
                     <a:ext uri="{9D8B030D-6E8A-4147-A177-3AD203B41FA5}">
                       <a16:colId xmlns="" xmlns:a16="http://schemas.microsoft.com/office/drawing/2014/main" val="1196863545"/>
@@ -21699,7 +21725,7 @@
                     <a:p>
                       <a:pPr algn="ctr" fontAlgn="base"/>
                       <a:r>
-                        <a:rPr lang="en-IN" b="0">
+                        <a:rPr lang="en-IN" b="0" dirty="0">
                           <a:solidFill>
                             <a:srgbClr val="5499DE"/>
                           </a:solidFill>
@@ -21712,7 +21738,7 @@
                     <a:p>
                       <a:pPr algn="ctr" fontAlgn="base"/>
                       <a:r>
-                        <a:rPr lang="en-IN" b="0">
+                        <a:rPr lang="en-IN" b="0" dirty="0">
                           <a:solidFill>
                             <a:srgbClr val="5499DE"/>
                           </a:solidFill>
@@ -21725,7 +21751,7 @@
                     <a:p>
                       <a:pPr algn="ctr" fontAlgn="base"/>
                       <a:r>
-                        <a:rPr lang="en-IN" b="0">
+                        <a:rPr lang="en-IN" b="0" dirty="0">
                           <a:solidFill>
                             <a:srgbClr val="5499DE"/>
                           </a:solidFill>
@@ -23197,14 +23223,49 @@
             <p:ph type="title"/>
           </p:nvPr>
         </p:nvSpPr>
-        <p:spPr/>
+        <p:spPr>
+          <a:xfrm>
+            <a:off x="335280" y="541020"/>
+            <a:ext cx="3825240" cy="1242060"/>
+          </a:xfrm>
+        </p:spPr>
         <p:txBody>
           <a:bodyPr>
-            <a:normAutofit fontScale="90000"/>
+            <a:normAutofit/>
           </a:bodyPr>
           <a:lstStyle/>
           <a:p>
             <a:r>
+              <a:rPr lang="en-IN" sz="2000" b="0" i="0" dirty="0">
+                <a:solidFill>
+                  <a:srgbClr val="610B38"/>
+                </a:solidFill>
+                <a:effectLst/>
+                <a:latin typeface="erdana"/>
+              </a:rPr>
+              <a:t>DML Commands in </a:t>
+            </a:r>
+            <a:r>
+              <a:rPr lang="en-IN" sz="2000" b="0" i="0" dirty="0" smtClean="0">
+                <a:solidFill>
+                  <a:srgbClr val="610B38"/>
+                </a:solidFill>
+                <a:effectLst/>
+                <a:latin typeface="erdana"/>
+              </a:rPr>
+              <a:t>SQL Insert</a:t>
+            </a:r>
+            <a:r>
+              <a:rPr lang="en-IN" sz="2000" b="0" i="0" dirty="0">
+                <a:solidFill>
+                  <a:srgbClr val="610B38"/>
+                </a:solidFill>
+                <a:effectLst/>
+                <a:latin typeface="erdana"/>
+              </a:rPr>
+              <a:t>:</a:t>
+            </a:r>
+            <a:r>
               <a:rPr lang="en-IN" b="0" i="0" dirty="0">
                 <a:solidFill>
                   <a:srgbClr val="610B38"/>
@@ -23212,26 +23273,7 @@
                 <a:effectLst/>
                 <a:latin typeface="erdana"/>
               </a:rPr>
-              <a:t>DML Commands in SQL</a:t>
-            </a:r>
-            <a:br>
-              <a:rPr lang="en-IN" b="0" i="0" dirty="0">
-                <a:solidFill>
-                  <a:srgbClr val="610B38"/>
-                </a:solidFill>
-                <a:effectLst/>
-                <a:latin typeface="erdana"/>
-              </a:rPr>
-            </a:br>
-            <a:r>
-              <a:rPr lang="en-IN" b="0" i="0" dirty="0">
-                <a:solidFill>
-                  <a:srgbClr val="610B38"/>
-                </a:solidFill>
-                <a:effectLst/>
-                <a:latin typeface="erdana"/>
-              </a:rPr>
-              <a:t>Insert:</a:t>
+              <a:t/>
             </a:r>
             <a:br>
               <a:rPr lang="en-IN" b="0" i="0" dirty="0">
@@ -23464,7 +23506,9 @@
         </p:nvSpPr>
         <p:spPr/>
         <p:txBody>
-          <a:bodyPr/>
+          <a:bodyPr>
+            <a:normAutofit fontScale="90000"/>
+          </a:bodyPr>
           <a:lstStyle/>
           <a:p>
             <a:r>
@@ -23673,7 +23717,9 @@
         </p:nvSpPr>
         <p:spPr/>
         <p:txBody>
-          <a:bodyPr/>
+          <a:bodyPr>
+            <a:normAutofit fontScale="90000"/>
+          </a:bodyPr>
           <a:lstStyle/>
           <a:p>
             <a:r>
@@ -23842,7 +23888,9 @@
         </p:nvSpPr>
         <p:spPr/>
         <p:txBody>
-          <a:bodyPr/>
+          <a:bodyPr>
+            <a:normAutofit fontScale="90000"/>
+          </a:bodyPr>
           <a:lstStyle/>
           <a:p>
             <a:r>
@@ -24177,7 +24225,7 @@
         </p:nvGraphicFramePr>
         <p:xfrm>
           <a:off x="838200" y="1959134"/>
-          <a:ext cx="10515600" cy="4084320"/>
+          <a:ext cx="10515600" cy="4632960"/>
         </p:xfrm>
         <a:graphic>
           <a:graphicData uri="http://schemas.openxmlformats.org/drawingml/2006/table">
@@ -27341,7 +27389,7 @@
         <p:spPr/>
         <p:txBody>
           <a:bodyPr anchor="ctr">
-            <a:normAutofit/>
+            <a:normAutofit fontScale="90000"/>
           </a:bodyPr>
           <a:lstStyle/>
           <a:p>
@@ -27407,7 +27455,7 @@
         </p:nvGraphicFramePr>
         <p:xfrm>
           <a:off x="838200" y="1892074"/>
-          <a:ext cx="5181601" cy="4218448"/>
+          <a:ext cx="5181601" cy="4359816"/>
         </p:xfrm>
         <a:graphic>
           <a:graphicData uri="http://schemas.openxmlformats.org/drawingml/2006/table">
@@ -28936,7 +28984,7 @@
         </p:nvSpPr>
         <p:spPr>
           <a:xfrm>
-            <a:off x="838200" y="2748640"/>
+            <a:off x="830580" y="3208020"/>
             <a:ext cx="9438290" cy="830997"/>
           </a:xfrm>
           <a:prstGeom prst="rect">
@@ -28993,8 +29041,8 @@
         </p:blipFill>
         <p:spPr bwMode="auto">
           <a:xfrm>
-            <a:off x="1651438" y="3635375"/>
-            <a:ext cx="5715000" cy="2857500"/>
+            <a:off x="3284220" y="4411980"/>
+            <a:ext cx="3884098" cy="1942049"/>
           </a:xfrm>
           <a:prstGeom prst="rect">
             <a:avLst/>
@@ -29059,7 +29107,9 @@
         </p:nvSpPr>
         <p:spPr/>
         <p:txBody>
-          <a:bodyPr/>
+          <a:bodyPr>
+            <a:normAutofit fontScale="90000"/>
+          </a:bodyPr>
           <a:lstStyle/>
           <a:p>
             <a:r>
@@ -29638,7 +29688,9 @@
         </p:nvSpPr>
         <p:spPr/>
         <p:txBody>
-          <a:bodyPr/>
+          <a:bodyPr>
+            <a:normAutofit fontScale="90000"/>
+          </a:bodyPr>
           <a:lstStyle/>
           <a:p>
             <a:r>
@@ -29872,7 +29924,9 @@
         </p:nvSpPr>
         <p:spPr/>
         <p:txBody>
-          <a:bodyPr/>
+          <a:bodyPr>
+            <a:normAutofit fontScale="90000"/>
+          </a:bodyPr>
           <a:lstStyle/>
           <a:p>
             <a:r>
@@ -30089,7 +30143,9 @@
         </p:nvSpPr>
         <p:spPr/>
         <p:txBody>
-          <a:bodyPr/>
+          <a:bodyPr>
+            <a:normAutofit fontScale="90000"/>
+          </a:bodyPr>
           <a:lstStyle/>
           <a:p>
             <a:r>
@@ -30725,7 +30781,9 @@
         </p:nvSpPr>
         <p:spPr/>
         <p:txBody>
-          <a:bodyPr/>
+          <a:bodyPr>
+            <a:normAutofit fontScale="90000"/>
+          </a:bodyPr>
           <a:lstStyle/>
           <a:p>
             <a:r>
@@ -31282,7 +31340,9 @@
         </p:nvSpPr>
         <p:spPr/>
         <p:txBody>
-          <a:bodyPr/>
+          <a:bodyPr>
+            <a:normAutofit fontScale="90000"/>
+          </a:bodyPr>
           <a:lstStyle/>
           <a:p>
             <a:r>
@@ -32363,7 +32423,9 @@
         </p:nvSpPr>
         <p:spPr/>
         <p:txBody>
-          <a:bodyPr/>
+          <a:bodyPr>
+            <a:normAutofit fontScale="90000"/>
+          </a:bodyPr>
           <a:lstStyle/>
           <a:p>
             <a:r>
@@ -33520,6 +33582,385 @@
 </file>
 
 <file path=ppt/slides/slide54.xml><?xml version="1.0" encoding="utf-8"?>
+<p:sld xmlns:a="http://schemas.openxmlformats.org/drawingml/2006/main" xmlns:r="http://schemas.openxmlformats.org/officeDocument/2006/relationships" xmlns:p="http://schemas.openxmlformats.org/presentationml/2006/main">
+  <p:cSld>
+    <p:spTree>
+      <p:nvGrpSpPr>
+        <p:cNvPr id="1" name=""/>
+        <p:cNvGrpSpPr/>
+        <p:nvPr/>
+      </p:nvGrpSpPr>
+      <p:grpSpPr>
+        <a:xfrm>
+          <a:off x="0" y="0"/>
+          <a:ext cx="0" cy="0"/>
+          <a:chOff x="0" y="0"/>
+          <a:chExt cx="0" cy="0"/>
+        </a:xfrm>
+      </p:grpSpPr>
+      <p:sp>
+        <p:nvSpPr>
+          <p:cNvPr id="2" name="Title 1"/>
+          <p:cNvSpPr>
+            <a:spLocks noGrp="1"/>
+          </p:cNvSpPr>
+          <p:nvPr>
+            <p:ph type="title"/>
+          </p:nvPr>
+        </p:nvSpPr>
+        <p:spPr/>
+        <p:txBody>
+          <a:bodyPr/>
+          <a:lstStyle/>
+          <a:p>
+            <a:r>
+              <a:rPr lang="en-IN" dirty="0" smtClean="0"/>
+              <a:t>Difference between function and SP</a:t>
+            </a:r>
+            <a:endParaRPr lang="en-US" dirty="0"/>
+          </a:p>
+        </p:txBody>
+      </p:sp>
+      <p:sp>
+        <p:nvSpPr>
+          <p:cNvPr id="1025" name="Rectangle 1"/>
+          <p:cNvSpPr>
+            <a:spLocks noChangeArrowheads="1"/>
+          </p:cNvSpPr>
+          <p:nvPr/>
+        </p:nvSpPr>
+        <p:spPr bwMode="auto">
+          <a:xfrm>
+            <a:off x="1478280" y="1600199"/>
+            <a:ext cx="6454140" cy="1890160"/>
+          </a:xfrm>
+          <a:prstGeom prst="rect">
+            <a:avLst/>
+          </a:prstGeom>
+          <a:solidFill>
+            <a:srgbClr val="F7F7F8"/>
+          </a:solidFill>
+          <a:ln w="9525">
+            <a:noFill/>
+            <a:miter lim="800000"/>
+            <a:headEnd/>
+            <a:tailEnd/>
+          </a:ln>
+          <a:effectLst/>
+        </p:spPr>
+        <p:txBody>
+          <a:bodyPr vert="horz" wrap="square" lIns="0" tIns="158700" rIns="0" bIns="158700" numCol="1" anchor="ctr" anchorCtr="0" compatLnSpc="1">
+            <a:prstTxWarp prst="textNoShape">
+              <a:avLst/>
+            </a:prstTxWarp>
+            <a:spAutoFit/>
+          </a:bodyPr>
+          <a:lstStyle/>
+          <a:p>
+            <a:pPr marL="0" marR="0" lvl="0" indent="0" algn="l" defTabSz="914400" rtl="0" eaLnBrk="1" fontAlgn="base" latinLnBrk="0" hangingPunct="1">
+              <a:lnSpc>
+                <a:spcPct val="100000"/>
+              </a:lnSpc>
+              <a:spcBef>
+                <a:spcPct val="0"/>
+              </a:spcBef>
+              <a:spcAft>
+                <a:spcPct val="0"/>
+              </a:spcAft>
+              <a:buClrTx/>
+              <a:buSzTx/>
+              <a:buFontTx/>
+              <a:buNone/>
+              <a:tabLst/>
+            </a:pPr>
+            <a:endParaRPr kumimoji="0" lang="en-US" sz="1800" b="0" i="0" u="none" strike="noStrike" cap="none" normalizeH="0" baseline="0" dirty="0" smtClean="0">
+              <a:ln>
+                <a:noFill/>
+              </a:ln>
+              <a:solidFill>
+                <a:schemeClr val="tx1"/>
+              </a:solidFill>
+              <a:effectLst/>
+              <a:latin typeface="Arial" pitchFamily="34" charset="0"/>
+              <a:cs typeface="Arial" pitchFamily="34" charset="0"/>
+            </a:endParaRPr>
+          </a:p>
+          <a:p>
+            <a:pPr marL="0" marR="0" lvl="0" indent="0" algn="l" defTabSz="914400" rtl="0" eaLnBrk="0" fontAlgn="base" latinLnBrk="0" hangingPunct="0">
+              <a:lnSpc>
+                <a:spcPct val="100000"/>
+              </a:lnSpc>
+              <a:spcBef>
+                <a:spcPct val="0"/>
+              </a:spcBef>
+              <a:spcAft>
+                <a:spcPct val="0"/>
+              </a:spcAft>
+              <a:buClrTx/>
+              <a:buSzTx/>
+              <a:buFontTx/>
+              <a:buChar char="•"/>
+              <a:tabLst/>
+            </a:pPr>
+            <a:r>
+              <a:rPr kumimoji="0" lang="en-US" sz="1100" b="0" i="0" u="none" strike="noStrike" cap="none" normalizeH="0" baseline="0" dirty="0" smtClean="0">
+                <a:ln>
+                  <a:noFill/>
+                </a:ln>
+                <a:solidFill>
+                  <a:srgbClr val="282829"/>
+                </a:solidFill>
+                <a:effectLst/>
+                <a:latin typeface="-apple-system"/>
+                <a:cs typeface="Arial" pitchFamily="34" charset="0"/>
+              </a:rPr>
+              <a:t>A stored procedure may have arguments that are </a:t>
+            </a:r>
+            <a:r>
+              <a:rPr kumimoji="0" lang="en-US" sz="1000" b="0" i="0" u="none" strike="noStrike" cap="none" normalizeH="0" baseline="0" dirty="0" smtClean="0">
+                <a:ln>
+                  <a:noFill/>
+                </a:ln>
+                <a:solidFill>
+                  <a:srgbClr val="636466"/>
+                </a:solidFill>
+                <a:effectLst/>
+                <a:latin typeface="Consolas" pitchFamily="49" charset="0"/>
+                <a:cs typeface="Arial" pitchFamily="34" charset="0"/>
+              </a:rPr>
+              <a:t>IN</a:t>
+            </a:r>
+            <a:r>
+              <a:rPr kumimoji="0" lang="en-US" sz="1100" b="0" i="0" u="none" strike="noStrike" cap="none" normalizeH="0" baseline="0" dirty="0" smtClean="0">
+                <a:ln>
+                  <a:noFill/>
+                </a:ln>
+                <a:solidFill>
+                  <a:srgbClr val="282829"/>
+                </a:solidFill>
+                <a:effectLst/>
+                <a:latin typeface="-apple-system"/>
+                <a:cs typeface="Arial" pitchFamily="34" charset="0"/>
+              </a:rPr>
+              <a:t>, </a:t>
+            </a:r>
+            <a:r>
+              <a:rPr kumimoji="0" lang="en-US" sz="1000" b="0" i="0" u="none" strike="noStrike" cap="none" normalizeH="0" baseline="0" dirty="0" smtClean="0">
+                <a:ln>
+                  <a:noFill/>
+                </a:ln>
+                <a:solidFill>
+                  <a:srgbClr val="636466"/>
+                </a:solidFill>
+                <a:effectLst/>
+                <a:latin typeface="Consolas" pitchFamily="49" charset="0"/>
+                <a:cs typeface="Arial" pitchFamily="34" charset="0"/>
+              </a:rPr>
+              <a:t>OUT</a:t>
+            </a:r>
+            <a:r>
+              <a:rPr kumimoji="0" lang="en-US" sz="1100" b="0" i="0" u="none" strike="noStrike" cap="none" normalizeH="0" baseline="0" dirty="0" smtClean="0">
+                <a:ln>
+                  <a:noFill/>
+                </a:ln>
+                <a:solidFill>
+                  <a:srgbClr val="282829"/>
+                </a:solidFill>
+                <a:effectLst/>
+                <a:latin typeface="-apple-system"/>
+                <a:cs typeface="Arial" pitchFamily="34" charset="0"/>
+              </a:rPr>
+              <a:t>, or </a:t>
+            </a:r>
+            <a:r>
+              <a:rPr kumimoji="0" lang="en-US" sz="1000" b="0" i="0" u="none" strike="noStrike" cap="none" normalizeH="0" baseline="0" dirty="0" smtClean="0">
+                <a:ln>
+                  <a:noFill/>
+                </a:ln>
+                <a:solidFill>
+                  <a:srgbClr val="636466"/>
+                </a:solidFill>
+                <a:effectLst/>
+                <a:latin typeface="Consolas" pitchFamily="49" charset="0"/>
+                <a:cs typeface="Arial" pitchFamily="34" charset="0"/>
+              </a:rPr>
+              <a:t>INOUT</a:t>
+            </a:r>
+            <a:r>
+              <a:rPr kumimoji="0" lang="en-US" sz="1100" b="0" i="0" u="none" strike="noStrike" cap="none" normalizeH="0" baseline="0" dirty="0" smtClean="0">
+                <a:ln>
+                  <a:noFill/>
+                </a:ln>
+                <a:solidFill>
+                  <a:srgbClr val="282829"/>
+                </a:solidFill>
+                <a:effectLst/>
+                <a:latin typeface="-apple-system"/>
+                <a:cs typeface="Arial" pitchFamily="34" charset="0"/>
+              </a:rPr>
+              <a:t>. Functions may only have </a:t>
+            </a:r>
+            <a:r>
+              <a:rPr kumimoji="0" lang="en-US" sz="1000" b="0" i="0" u="none" strike="noStrike" cap="none" normalizeH="0" baseline="0" dirty="0" smtClean="0">
+                <a:ln>
+                  <a:noFill/>
+                </a:ln>
+                <a:solidFill>
+                  <a:srgbClr val="636466"/>
+                </a:solidFill>
+                <a:effectLst/>
+                <a:latin typeface="Consolas" pitchFamily="49" charset="0"/>
+                <a:cs typeface="Arial" pitchFamily="34" charset="0"/>
+              </a:rPr>
+              <a:t>IN</a:t>
+            </a:r>
+            <a:r>
+              <a:rPr kumimoji="0" lang="en-US" sz="1100" b="0" i="0" u="none" strike="noStrike" cap="none" normalizeH="0" baseline="0" dirty="0" smtClean="0">
+                <a:ln>
+                  <a:noFill/>
+                </a:ln>
+                <a:solidFill>
+                  <a:srgbClr val="282829"/>
+                </a:solidFill>
+                <a:effectLst/>
+                <a:latin typeface="-apple-system"/>
+                <a:cs typeface="Arial" pitchFamily="34" charset="0"/>
+              </a:rPr>
+              <a:t> arguments.</a:t>
+            </a:r>
+          </a:p>
+          <a:p>
+            <a:pPr marL="0" marR="0" lvl="0" indent="0" algn="l" defTabSz="914400" rtl="0" eaLnBrk="0" fontAlgn="base" latinLnBrk="0" hangingPunct="0">
+              <a:lnSpc>
+                <a:spcPct val="100000"/>
+              </a:lnSpc>
+              <a:spcBef>
+                <a:spcPct val="0"/>
+              </a:spcBef>
+              <a:spcAft>
+                <a:spcPct val="0"/>
+              </a:spcAft>
+              <a:buClrTx/>
+              <a:buSzTx/>
+              <a:buFontTx/>
+              <a:buChar char="•"/>
+              <a:tabLst/>
+            </a:pPr>
+            <a:r>
+              <a:rPr kumimoji="0" lang="en-US" sz="1100" b="0" i="0" u="none" strike="noStrike" cap="none" normalizeH="0" baseline="0" dirty="0" smtClean="0">
+                <a:ln>
+                  <a:noFill/>
+                </a:ln>
+                <a:solidFill>
+                  <a:srgbClr val="282829"/>
+                </a:solidFill>
+                <a:effectLst/>
+                <a:latin typeface="-apple-system"/>
+                <a:cs typeface="Arial" pitchFamily="34" charset="0"/>
+              </a:rPr>
+              <a:t>A procedure may have one or more </a:t>
+            </a:r>
+            <a:r>
+              <a:rPr kumimoji="0" lang="en-US" sz="1000" b="0" i="0" u="none" strike="noStrike" cap="none" normalizeH="0" baseline="0" dirty="0" smtClean="0">
+                <a:ln>
+                  <a:noFill/>
+                </a:ln>
+                <a:solidFill>
+                  <a:srgbClr val="636466"/>
+                </a:solidFill>
+                <a:effectLst/>
+                <a:latin typeface="Consolas" pitchFamily="49" charset="0"/>
+                <a:cs typeface="Arial" pitchFamily="34" charset="0"/>
+              </a:rPr>
+              <a:t>SELECT</a:t>
+            </a:r>
+            <a:r>
+              <a:rPr kumimoji="0" lang="en-US" sz="1100" b="0" i="0" u="none" strike="noStrike" cap="none" normalizeH="0" baseline="0" dirty="0" smtClean="0">
+                <a:ln>
+                  <a:noFill/>
+                </a:ln>
+                <a:solidFill>
+                  <a:srgbClr val="282829"/>
+                </a:solidFill>
+                <a:effectLst/>
+                <a:latin typeface="-apple-system"/>
+                <a:cs typeface="Arial" pitchFamily="34" charset="0"/>
+              </a:rPr>
+              <a:t> queries (or other statements that have results), and these create result sets readable by the client that called the procedure. Functions cannot have result sets like this.</a:t>
+            </a:r>
+          </a:p>
+          <a:p>
+            <a:pPr marL="0" marR="0" lvl="0" indent="0" algn="l" defTabSz="914400" rtl="0" eaLnBrk="0" fontAlgn="base" latinLnBrk="0" hangingPunct="0">
+              <a:lnSpc>
+                <a:spcPct val="100000"/>
+              </a:lnSpc>
+              <a:spcBef>
+                <a:spcPct val="0"/>
+              </a:spcBef>
+              <a:spcAft>
+                <a:spcPct val="0"/>
+              </a:spcAft>
+              <a:buClrTx/>
+              <a:buSzTx/>
+              <a:buFontTx/>
+              <a:buChar char="•"/>
+              <a:tabLst/>
+            </a:pPr>
+            <a:r>
+              <a:rPr kumimoji="0" lang="en-US" sz="1100" b="0" i="0" u="none" strike="noStrike" cap="none" normalizeH="0" baseline="0" dirty="0" smtClean="0">
+                <a:ln>
+                  <a:noFill/>
+                </a:ln>
+                <a:solidFill>
+                  <a:srgbClr val="282829"/>
+                </a:solidFill>
+                <a:effectLst/>
+                <a:latin typeface="-apple-system"/>
+                <a:cs typeface="Arial" pitchFamily="34" charset="0"/>
+              </a:rPr>
+              <a:t>Functions have a scalar return value. Procedures do not have a return value.</a:t>
+            </a:r>
+          </a:p>
+          <a:p>
+            <a:pPr marL="0" marR="0" lvl="0" indent="0" algn="l" defTabSz="914400" rtl="0" eaLnBrk="0" fontAlgn="base" latinLnBrk="0" hangingPunct="0">
+              <a:lnSpc>
+                <a:spcPct val="100000"/>
+              </a:lnSpc>
+              <a:spcBef>
+                <a:spcPct val="0"/>
+              </a:spcBef>
+              <a:spcAft>
+                <a:spcPct val="0"/>
+              </a:spcAft>
+              <a:buClrTx/>
+              <a:buSzTx/>
+              <a:buFontTx/>
+              <a:buNone/>
+              <a:tabLst/>
+            </a:pPr>
+            <a:endParaRPr kumimoji="0" lang="en-US" sz="1800" b="0" i="0" u="none" strike="noStrike" cap="none" normalizeH="0" baseline="0" dirty="0" smtClean="0">
+              <a:ln>
+                <a:noFill/>
+              </a:ln>
+              <a:solidFill>
+                <a:schemeClr val="tx1"/>
+              </a:solidFill>
+              <a:effectLst/>
+              <a:latin typeface="Arial" pitchFamily="34" charset="0"/>
+              <a:cs typeface="Arial" pitchFamily="34" charset="0"/>
+            </a:endParaRPr>
+          </a:p>
+        </p:txBody>
+      </p:sp>
+    </p:spTree>
+  </p:cSld>
+  <p:clrMapOvr>
+    <a:masterClrMapping/>
+  </p:clrMapOvr>
+</p:sld>
+</file>
+
+<file path=ppt/slides/slide55.xml><?xml version="1.0" encoding="utf-8"?>
 <p:sld xmlns:a="http://schemas.openxmlformats.org/drawingml/2006/main" xmlns:r="http://schemas.openxmlformats.org/officeDocument/2006/relationships" xmlns:p="http://schemas.openxmlformats.org/presentationml/2006/main">
   <p:cSld>
     <p:spTree>
@@ -33603,7 +34044,7 @@
 </p:sld>
 </file>
 
-<file path=ppt/slides/slide55.xml><?xml version="1.0" encoding="utf-8"?>
+<file path=ppt/slides/slide56.xml><?xml version="1.0" encoding="utf-8"?>
 <p:sld xmlns:a="http://schemas.openxmlformats.org/drawingml/2006/main" xmlns:r="http://schemas.openxmlformats.org/officeDocument/2006/relationships" xmlns:p="http://schemas.openxmlformats.org/presentationml/2006/main">
   <p:cSld>
     <p:spTree>
@@ -33882,7 +34323,7 @@
 </p:sld>
 </file>
 
-<file path=ppt/slides/slide56.xml><?xml version="1.0" encoding="utf-8"?>
+<file path=ppt/slides/slide57.xml><?xml version="1.0" encoding="utf-8"?>
 <p:sld xmlns:a="http://schemas.openxmlformats.org/drawingml/2006/main" xmlns:r="http://schemas.openxmlformats.org/officeDocument/2006/relationships" xmlns:p="http://schemas.openxmlformats.org/presentationml/2006/main">
   <p:cSld>
     <p:spTree>
@@ -34115,7 +34556,7 @@
 </p:sld>
 </file>
 
-<file path=ppt/slides/slide57.xml><?xml version="1.0" encoding="utf-8"?>
+<file path=ppt/slides/slide58.xml><?xml version="1.0" encoding="utf-8"?>
 <p:sld xmlns:a="http://schemas.openxmlformats.org/drawingml/2006/main" xmlns:r="http://schemas.openxmlformats.org/officeDocument/2006/relationships" xmlns:p="http://schemas.openxmlformats.org/presentationml/2006/main">
   <p:cSld>
     <p:spTree>
@@ -34564,7 +35005,7 @@
         <p:spPr>
           <a:xfrm>
             <a:off x="588579" y="3768638"/>
-            <a:ext cx="6096000" cy="2308324"/>
+            <a:ext cx="6096000" cy="2585323"/>
           </a:xfrm>
           <a:prstGeom prst="rect">
             <a:avLst/>
@@ -34768,6 +35209,16 @@
               </a:rPr>
               <a:t>; </a:t>
             </a:r>
+            <a:endParaRPr lang="en-IN" b="0" i="0" dirty="0" smtClean="0">
+              <a:solidFill>
+                <a:srgbClr val="000000"/>
+              </a:solidFill>
+              <a:effectLst/>
+              <a:latin typeface="inherit"/>
+            </a:endParaRPr>
+          </a:p>
+          <a:p>
+            <a:pPr algn="l" rtl="0" fontAlgn="base"/>
             <a:endParaRPr lang="en-IN" b="0" i="0" dirty="0">
               <a:solidFill>
                 <a:srgbClr val="787878"/>
@@ -34855,7 +35306,7 @@
 </p:sld>
 </file>
 
-<file path=ppt/slides/slide58.xml><?xml version="1.0" encoding="utf-8"?>
+<file path=ppt/slides/slide59.xml><?xml version="1.0" encoding="utf-8"?>
 <p:sld xmlns:a="http://schemas.openxmlformats.org/drawingml/2006/main" xmlns:r="http://schemas.openxmlformats.org/officeDocument/2006/relationships" xmlns:p="http://schemas.openxmlformats.org/presentationml/2006/main">
   <p:cSld>
     <p:spTree>
@@ -35154,18 +35605,8 @@
           </a:p>
           <a:p>
             <a:pPr algn="l" rtl="0" fontAlgn="base"/>
-            <a:endParaRPr lang="en-US" b="0" i="0" dirty="0">
-              <a:solidFill>
-                <a:srgbClr val="787878"/>
-              </a:solidFill>
-              <a:effectLst/>
-              <a:latin typeface="inherit"/>
-            </a:endParaRPr>
-          </a:p>
-          <a:p>
-            <a:pPr algn="l" rtl="0" fontAlgn="base"/>
-            <a:r>
-              <a:rPr lang="en-US" b="0" i="0" dirty="0">
+            <a:r>
+              <a:rPr lang="en-US" b="0" i="0" dirty="0" smtClean="0">
                 <a:solidFill>
                   <a:srgbClr val="000000"/>
                 </a:solidFill>
@@ -35240,7 +35681,7 @@
         </p:nvSpPr>
         <p:spPr>
           <a:xfrm>
-            <a:off x="515007" y="2981436"/>
+            <a:off x="591207" y="3248136"/>
             <a:ext cx="6096000" cy="3416320"/>
           </a:xfrm>
           <a:prstGeom prst="rect">
@@ -35255,97 +35696,177 @@
           <a:lstStyle/>
           <a:p>
             <a:r>
-              <a:rPr lang="en-US" dirty="0"/>
+              <a:rPr lang="en-US" b="1" dirty="0">
+                <a:solidFill>
+                  <a:srgbClr val="00B050"/>
+                </a:solidFill>
+              </a:rPr>
               <a:t>SELECT </a:t>
             </a:r>
           </a:p>
           <a:p>
             <a:r>
-              <a:rPr lang="en-US" dirty="0"/>
+              <a:rPr lang="en-US" b="1" dirty="0">
+                <a:solidFill>
+                  <a:srgbClr val="00B050"/>
+                </a:solidFill>
+              </a:rPr>
               <a:t>    </a:t>
             </a:r>
             <a:r>
-              <a:rPr lang="en-US" dirty="0" err="1"/>
+              <a:rPr lang="en-US" b="1" dirty="0" err="1">
+                <a:solidFill>
+                  <a:srgbClr val="00B050"/>
+                </a:solidFill>
+              </a:rPr>
               <a:t>employee_id</a:t>
             </a:r>
             <a:r>
-              <a:rPr lang="en-US" dirty="0"/>
+              <a:rPr lang="en-US" b="1" dirty="0">
+                <a:solidFill>
+                  <a:srgbClr val="00B050"/>
+                </a:solidFill>
+              </a:rPr>
               <a:t>, </a:t>
             </a:r>
           </a:p>
           <a:p>
             <a:r>
-              <a:rPr lang="en-US" dirty="0"/>
+              <a:rPr lang="en-US" b="1" dirty="0">
+                <a:solidFill>
+                  <a:srgbClr val="00B050"/>
+                </a:solidFill>
+              </a:rPr>
               <a:t>    </a:t>
             </a:r>
             <a:r>
-              <a:rPr lang="en-US" dirty="0" err="1"/>
+              <a:rPr lang="en-US" b="1" dirty="0" err="1">
+                <a:solidFill>
+                  <a:srgbClr val="00B050"/>
+                </a:solidFill>
+              </a:rPr>
               <a:t>first_name</a:t>
             </a:r>
             <a:r>
-              <a:rPr lang="en-US" dirty="0"/>
+              <a:rPr lang="en-US" b="1" dirty="0">
+                <a:solidFill>
+                  <a:srgbClr val="00B050"/>
+                </a:solidFill>
+              </a:rPr>
               <a:t>, </a:t>
             </a:r>
           </a:p>
           <a:p>
             <a:r>
-              <a:rPr lang="en-US" dirty="0"/>
+              <a:rPr lang="en-US" b="1" dirty="0">
+                <a:solidFill>
+                  <a:srgbClr val="00B050"/>
+                </a:solidFill>
+              </a:rPr>
               <a:t>    </a:t>
             </a:r>
             <a:r>
-              <a:rPr lang="en-US" dirty="0" err="1"/>
+              <a:rPr lang="en-US" b="1" dirty="0" err="1">
+                <a:solidFill>
+                  <a:srgbClr val="00B050"/>
+                </a:solidFill>
+              </a:rPr>
               <a:t>last_name</a:t>
             </a:r>
             <a:r>
-              <a:rPr lang="en-US" dirty="0"/>
+              <a:rPr lang="en-US" b="1" dirty="0">
+                <a:solidFill>
+                  <a:srgbClr val="00B050"/>
+                </a:solidFill>
+              </a:rPr>
               <a:t>, </a:t>
             </a:r>
           </a:p>
           <a:p>
             <a:r>
-              <a:rPr lang="en-US" dirty="0"/>
+              <a:rPr lang="en-US" b="1" dirty="0">
+                <a:solidFill>
+                  <a:srgbClr val="00B050"/>
+                </a:solidFill>
+              </a:rPr>
               <a:t>    salary</a:t>
             </a:r>
           </a:p>
           <a:p>
             <a:r>
-              <a:rPr lang="en-US" dirty="0"/>
+              <a:rPr lang="en-US" b="1" dirty="0">
+                <a:solidFill>
+                  <a:srgbClr val="00B050"/>
+                </a:solidFill>
+              </a:rPr>
               <a:t>FROM</a:t>
             </a:r>
           </a:p>
           <a:p>
             <a:r>
-              <a:rPr lang="en-US" dirty="0"/>
+              <a:rPr lang="en-US" b="1" dirty="0">
+                <a:solidFill>
+                  <a:srgbClr val="00B050"/>
+                </a:solidFill>
+              </a:rPr>
               <a:t>    employees</a:t>
             </a:r>
           </a:p>
           <a:p>
             <a:r>
-              <a:rPr lang="en-US" dirty="0"/>
+              <a:rPr lang="en-US" b="1" dirty="0">
+                <a:solidFill>
+                  <a:srgbClr val="00B050"/>
+                </a:solidFill>
+              </a:rPr>
               <a:t>WHERE</a:t>
             </a:r>
           </a:p>
           <a:p>
             <a:r>
-              <a:rPr lang="en-US" dirty="0"/>
-              <a:t>    salary &gt; (SELECT </a:t>
-            </a:r>
-          </a:p>
-          <a:p>
-            <a:r>
-              <a:rPr lang="en-US" dirty="0"/>
+              <a:rPr lang="en-US" b="1" dirty="0">
+                <a:solidFill>
+                  <a:srgbClr val="00B050"/>
+                </a:solidFill>
+              </a:rPr>
+              <a:t>    salary &gt; </a:t>
+            </a:r>
+            <a:r>
+              <a:rPr lang="en-US" b="1" dirty="0">
+                <a:solidFill>
+                  <a:srgbClr val="002060"/>
+                </a:solidFill>
+              </a:rPr>
+              <a:t>(SELECT </a:t>
+            </a:r>
+          </a:p>
+          <a:p>
+            <a:r>
+              <a:rPr lang="en-US" b="1" dirty="0">
+                <a:solidFill>
+                  <a:srgbClr val="002060"/>
+                </a:solidFill>
+              </a:rPr>
               <a:t>            AVG(salary)</a:t>
             </a:r>
           </a:p>
           <a:p>
             <a:r>
-              <a:rPr lang="en-US" dirty="0"/>
+              <a:rPr lang="en-US" b="1" dirty="0">
+                <a:solidFill>
+                  <a:srgbClr val="002060"/>
+                </a:solidFill>
+              </a:rPr>
               <a:t>        FROM</a:t>
             </a:r>
           </a:p>
           <a:p>
             <a:r>
-              <a:rPr lang="en-US" dirty="0"/>
+              <a:rPr lang="en-US" b="1" dirty="0">
+                <a:solidFill>
+                  <a:srgbClr val="002060"/>
+                </a:solidFill>
+              </a:rPr>
               <a:t>            employees);</a:t>
             </a:r>
           </a:p>
@@ -35355,197 +35876,6 @@
     <p:extLst>
       <p:ext uri="{BB962C8B-B14F-4D97-AF65-F5344CB8AC3E}">
         <p14:creationId xmlns="" xmlns:p14="http://schemas.microsoft.com/office/powerpoint/2010/main" val="3676459845"/>
-      </p:ext>
-    </p:extLst>
-  </p:cSld>
-  <p:clrMapOvr>
-    <a:masterClrMapping/>
-  </p:clrMapOvr>
-</p:sld>
-</file>
-
-<file path=ppt/slides/slide59.xml><?xml version="1.0" encoding="utf-8"?>
-<p:sld xmlns:a="http://schemas.openxmlformats.org/drawingml/2006/main" xmlns:r="http://schemas.openxmlformats.org/officeDocument/2006/relationships" xmlns:p="http://schemas.openxmlformats.org/presentationml/2006/main">
-  <p:cSld>
-    <p:spTree>
-      <p:nvGrpSpPr>
-        <p:cNvPr id="1" name=""/>
-        <p:cNvGrpSpPr/>
-        <p:nvPr/>
-      </p:nvGrpSpPr>
-      <p:grpSpPr>
-        <a:xfrm>
-          <a:off x="0" y="0"/>
-          <a:ext cx="0" cy="0"/>
-          <a:chOff x="0" y="0"/>
-          <a:chExt cx="0" cy="0"/>
-        </a:xfrm>
-      </p:grpSpPr>
-      <p:sp>
-        <p:nvSpPr>
-          <p:cNvPr id="4" name="TextBox 3">
-            <a:extLst>
-              <a:ext uri="{FF2B5EF4-FFF2-40B4-BE49-F238E27FC236}">
-                <a16:creationId xmlns="" xmlns:a16="http://schemas.microsoft.com/office/drawing/2014/main" id="{FBFFC514-6C20-D10F-D927-4D2F312E050C}"/>
-              </a:ext>
-            </a:extLst>
-          </p:cNvPr>
-          <p:cNvSpPr txBox="1"/>
-          <p:nvPr/>
-        </p:nvSpPr>
-        <p:spPr>
-          <a:xfrm>
-            <a:off x="378373" y="277955"/>
-            <a:ext cx="8818179" cy="4062651"/>
-          </a:xfrm>
-          <a:prstGeom prst="rect">
-            <a:avLst/>
-          </a:prstGeom>
-          <a:noFill/>
-        </p:spPr>
-        <p:txBody>
-          <a:bodyPr wrap="square">
-            <a:spAutoFit/>
-          </a:bodyPr>
-          <a:lstStyle/>
-          <a:p>
-            <a:r>
-              <a:rPr lang="en-US" sz="2400" b="1" dirty="0"/>
-              <a:t>Plain </a:t>
-            </a:r>
-            <a:r>
-              <a:rPr lang="en-US" sz="2400" b="1" dirty="0" err="1"/>
-              <a:t>SubQuery</a:t>
-            </a:r>
-            <a:r>
-              <a:rPr lang="en-US" sz="2400" b="1" dirty="0"/>
-              <a:t>:</a:t>
-            </a:r>
-          </a:p>
-          <a:p>
-            <a:r>
-              <a:rPr lang="en-US" dirty="0"/>
-              <a:t>First, you can execute the subquery that returns the average salary of all employees independently.</a:t>
-            </a:r>
-          </a:p>
-          <a:p>
-            <a:endParaRPr lang="en-US" dirty="0"/>
-          </a:p>
-          <a:p>
-            <a:r>
-              <a:rPr lang="en-US" dirty="0"/>
-              <a:t>SELECT </a:t>
-            </a:r>
-          </a:p>
-          <a:p>
-            <a:r>
-              <a:rPr lang="en-US" dirty="0"/>
-              <a:t>    AVG(salary)</a:t>
-            </a:r>
-          </a:p>
-          <a:p>
-            <a:r>
-              <a:rPr lang="en-US" dirty="0"/>
-              <a:t>FROM</a:t>
-            </a:r>
-          </a:p>
-          <a:p>
-            <a:r>
-              <a:rPr lang="en-US" dirty="0"/>
-              <a:t>    employees;</a:t>
-            </a:r>
-          </a:p>
-          <a:p>
-            <a:r>
-              <a:rPr lang="en-US" dirty="0"/>
-              <a:t>Code language: SQL (Structured Query Language) (</a:t>
-            </a:r>
-            <a:r>
-              <a:rPr lang="en-US" dirty="0" err="1"/>
-              <a:t>sql</a:t>
-            </a:r>
-            <a:r>
-              <a:rPr lang="en-US" dirty="0"/>
-              <a:t>)</a:t>
-            </a:r>
-          </a:p>
-          <a:p>
-            <a:r>
-              <a:rPr lang="en-US" dirty="0"/>
-              <a:t>Second, the database system needs to evaluate the subquery only once.</a:t>
-            </a:r>
-          </a:p>
-          <a:p>
-            <a:endParaRPr lang="en-US" dirty="0"/>
-          </a:p>
-          <a:p>
-            <a:r>
-              <a:rPr lang="en-US" dirty="0"/>
-              <a:t>Third, the outer query makes use of the result returned from the subquery. The outer query depends on the subquery for its value. However, the subquery does not depend on the outer query. Sometimes, we call this subquery is a plain subquery.</a:t>
-            </a:r>
-            <a:endParaRPr lang="en-IN" dirty="0"/>
-          </a:p>
-        </p:txBody>
-      </p:sp>
-      <p:sp>
-        <p:nvSpPr>
-          <p:cNvPr id="6" name="TextBox 5">
-            <a:extLst>
-              <a:ext uri="{FF2B5EF4-FFF2-40B4-BE49-F238E27FC236}">
-                <a16:creationId xmlns="" xmlns:a16="http://schemas.microsoft.com/office/drawing/2014/main" id="{4EEF10C7-6A00-67CC-48A7-DF5284AC9306}"/>
-              </a:ext>
-            </a:extLst>
-          </p:cNvPr>
-          <p:cNvSpPr txBox="1"/>
-          <p:nvPr/>
-        </p:nvSpPr>
-        <p:spPr>
-          <a:xfrm>
-            <a:off x="378373" y="4643313"/>
-            <a:ext cx="9175531" cy="1200329"/>
-          </a:xfrm>
-          <a:prstGeom prst="rect">
-            <a:avLst/>
-          </a:prstGeom>
-          <a:noFill/>
-        </p:spPr>
-        <p:txBody>
-          <a:bodyPr wrap="square">
-            <a:spAutoFit/>
-          </a:bodyPr>
-          <a:lstStyle/>
-          <a:p>
-            <a:pPr algn="l"/>
-            <a:r>
-              <a:rPr lang="en-US" b="0" i="0" dirty="0">
-                <a:solidFill>
-                  <a:srgbClr val="000000"/>
-                </a:solidFill>
-                <a:effectLst/>
-                <a:latin typeface="-apple-system"/>
-              </a:rPr>
-              <a:t>Unlike a plain subquery, a correlated subquery is a subquery that uses the values from the outer query. Also, a correlated subquery may be evaluated once for each row selected by the outer query. Because of this, a query that uses a correlated subquery may be slow.</a:t>
-            </a:r>
-          </a:p>
-          <a:p>
-            <a:pPr algn="l"/>
-            <a:r>
-              <a:rPr lang="en-US" b="0" i="0" dirty="0">
-                <a:solidFill>
-                  <a:srgbClr val="000000"/>
-                </a:solidFill>
-                <a:effectLst/>
-                <a:latin typeface="-apple-system"/>
-              </a:rPr>
-              <a:t>A correlated subquery is also known as a repeating subquery or a synchronized subquery.</a:t>
-            </a:r>
-          </a:p>
-        </p:txBody>
-      </p:sp>
-    </p:spTree>
-    <p:extLst>
-      <p:ext uri="{BB962C8B-B14F-4D97-AF65-F5344CB8AC3E}">
-        <p14:creationId xmlns="" xmlns:p14="http://schemas.microsoft.com/office/powerpoint/2010/main" val="1615322869"/>
       </p:ext>
     </p:extLst>
   </p:cSld>
@@ -35642,6 +35972,213 @@
       </p:grpSpPr>
       <p:sp>
         <p:nvSpPr>
+          <p:cNvPr id="4" name="TextBox 3">
+            <a:extLst>
+              <a:ext uri="{FF2B5EF4-FFF2-40B4-BE49-F238E27FC236}">
+                <a16:creationId xmlns="" xmlns:a16="http://schemas.microsoft.com/office/drawing/2014/main" id="{FBFFC514-6C20-D10F-D927-4D2F312E050C}"/>
+              </a:ext>
+            </a:extLst>
+          </p:cNvPr>
+          <p:cNvSpPr txBox="1"/>
+          <p:nvPr/>
+        </p:nvSpPr>
+        <p:spPr>
+          <a:xfrm>
+            <a:off x="378373" y="277955"/>
+            <a:ext cx="8818179" cy="3785652"/>
+          </a:xfrm>
+          <a:prstGeom prst="rect">
+            <a:avLst/>
+          </a:prstGeom>
+          <a:noFill/>
+        </p:spPr>
+        <p:txBody>
+          <a:bodyPr wrap="square">
+            <a:spAutoFit/>
+          </a:bodyPr>
+          <a:lstStyle/>
+          <a:p>
+            <a:r>
+              <a:rPr lang="en-US" sz="2400" b="1" dirty="0"/>
+              <a:t>Plain </a:t>
+            </a:r>
+            <a:r>
+              <a:rPr lang="en-US" sz="2400" b="1" dirty="0" err="1"/>
+              <a:t>SubQuery</a:t>
+            </a:r>
+            <a:r>
+              <a:rPr lang="en-US" sz="2400" b="1" dirty="0"/>
+              <a:t>:</a:t>
+            </a:r>
+          </a:p>
+          <a:p>
+            <a:r>
+              <a:rPr lang="en-US" dirty="0"/>
+              <a:t>First, you can execute the subquery that returns the average salary of all employees independently.</a:t>
+            </a:r>
+          </a:p>
+          <a:p>
+            <a:endParaRPr lang="en-US" dirty="0"/>
+          </a:p>
+          <a:p>
+            <a:r>
+              <a:rPr lang="en-US" b="1" dirty="0">
+                <a:solidFill>
+                  <a:srgbClr val="002060"/>
+                </a:solidFill>
+              </a:rPr>
+              <a:t>SELECT </a:t>
+            </a:r>
+          </a:p>
+          <a:p>
+            <a:r>
+              <a:rPr lang="en-US" b="1" dirty="0">
+                <a:solidFill>
+                  <a:srgbClr val="002060"/>
+                </a:solidFill>
+              </a:rPr>
+              <a:t>    AVG(salary)</a:t>
+            </a:r>
+          </a:p>
+          <a:p>
+            <a:r>
+              <a:rPr lang="en-US" b="1" dirty="0">
+                <a:solidFill>
+                  <a:srgbClr val="002060"/>
+                </a:solidFill>
+              </a:rPr>
+              <a:t>FROM</a:t>
+            </a:r>
+          </a:p>
+          <a:p>
+            <a:r>
+              <a:rPr lang="en-US" b="1" dirty="0">
+                <a:solidFill>
+                  <a:srgbClr val="002060"/>
+                </a:solidFill>
+              </a:rPr>
+              <a:t>    employees;</a:t>
+            </a:r>
+          </a:p>
+          <a:p>
+            <a:r>
+              <a:rPr lang="en-US" dirty="0"/>
+              <a:t>Code language: SQL (Structured Query Language) (</a:t>
+            </a:r>
+            <a:r>
+              <a:rPr lang="en-US" dirty="0" err="1"/>
+              <a:t>sql</a:t>
+            </a:r>
+            <a:r>
+              <a:rPr lang="en-US" dirty="0"/>
+              <a:t>)</a:t>
+            </a:r>
+          </a:p>
+          <a:p>
+            <a:r>
+              <a:rPr lang="en-US" dirty="0"/>
+              <a:t>Second, the database system needs to evaluate the subquery only once.</a:t>
+            </a:r>
+          </a:p>
+          <a:p>
+            <a:endParaRPr lang="en-US" dirty="0"/>
+          </a:p>
+          <a:p>
+            <a:r>
+              <a:rPr lang="en-US" dirty="0"/>
+              <a:t>Third, the outer query makes use of the result returned from the subquery. The outer query depends on the subquery for its value. However, the subquery does not depend on the outer query. Sometimes, we call this subquery is a plain subquery.</a:t>
+            </a:r>
+            <a:endParaRPr lang="en-IN" dirty="0"/>
+          </a:p>
+        </p:txBody>
+      </p:sp>
+      <p:sp>
+        <p:nvSpPr>
+          <p:cNvPr id="6" name="TextBox 5">
+            <a:extLst>
+              <a:ext uri="{FF2B5EF4-FFF2-40B4-BE49-F238E27FC236}">
+                <a16:creationId xmlns="" xmlns:a16="http://schemas.microsoft.com/office/drawing/2014/main" id="{4EEF10C7-6A00-67CC-48A7-DF5284AC9306}"/>
+              </a:ext>
+            </a:extLst>
+          </p:cNvPr>
+          <p:cNvSpPr txBox="1"/>
+          <p:nvPr/>
+        </p:nvSpPr>
+        <p:spPr>
+          <a:xfrm>
+            <a:off x="378373" y="4643313"/>
+            <a:ext cx="9175531" cy="1200329"/>
+          </a:xfrm>
+          <a:prstGeom prst="rect">
+            <a:avLst/>
+          </a:prstGeom>
+          <a:noFill/>
+        </p:spPr>
+        <p:txBody>
+          <a:bodyPr wrap="square">
+            <a:spAutoFit/>
+          </a:bodyPr>
+          <a:lstStyle/>
+          <a:p>
+            <a:pPr algn="l"/>
+            <a:r>
+              <a:rPr lang="en-US" b="0" i="0" dirty="0">
+                <a:solidFill>
+                  <a:srgbClr val="000000"/>
+                </a:solidFill>
+                <a:effectLst/>
+                <a:latin typeface="-apple-system"/>
+              </a:rPr>
+              <a:t>Unlike a plain subquery, a correlated subquery is a subquery that uses the values from the outer query. Also, a correlated subquery may be evaluated once for each row selected by the outer query. Because of this, a query that uses a correlated subquery may be slow.</a:t>
+            </a:r>
+          </a:p>
+          <a:p>
+            <a:pPr algn="l"/>
+            <a:r>
+              <a:rPr lang="en-US" b="0" i="0" dirty="0">
+                <a:solidFill>
+                  <a:srgbClr val="000000"/>
+                </a:solidFill>
+                <a:effectLst/>
+                <a:latin typeface="-apple-system"/>
+              </a:rPr>
+              <a:t>A correlated subquery is also known as a repeating subquery or a synchronized subquery.</a:t>
+            </a:r>
+          </a:p>
+        </p:txBody>
+      </p:sp>
+    </p:spTree>
+    <p:extLst>
+      <p:ext uri="{BB962C8B-B14F-4D97-AF65-F5344CB8AC3E}">
+        <p14:creationId xmlns="" xmlns:p14="http://schemas.microsoft.com/office/powerpoint/2010/main" val="1615322869"/>
+      </p:ext>
+    </p:extLst>
+  </p:cSld>
+  <p:clrMapOvr>
+    <a:masterClrMapping/>
+  </p:clrMapOvr>
+</p:sld>
+</file>
+
+<file path=ppt/slides/slide61.xml><?xml version="1.0" encoding="utf-8"?>
+<p:sld xmlns:a="http://schemas.openxmlformats.org/drawingml/2006/main" xmlns:r="http://schemas.openxmlformats.org/officeDocument/2006/relationships" xmlns:p="http://schemas.openxmlformats.org/presentationml/2006/main">
+  <p:cSld>
+    <p:spTree>
+      <p:nvGrpSpPr>
+        <p:cNvPr id="1" name=""/>
+        <p:cNvGrpSpPr/>
+        <p:nvPr/>
+      </p:nvGrpSpPr>
+      <p:grpSpPr>
+        <a:xfrm>
+          <a:off x="0" y="0"/>
+          <a:ext cx="0" cy="0"/>
+          <a:chOff x="0" y="0"/>
+          <a:chExt cx="0" cy="0"/>
+        </a:xfrm>
+      </p:grpSpPr>
+      <p:sp>
+        <p:nvSpPr>
           <p:cNvPr id="2" name="Title 1">
             <a:extLst>
               <a:ext uri="{FF2B5EF4-FFF2-40B4-BE49-F238E27FC236}">
@@ -35658,7 +36195,9 @@
         </p:nvSpPr>
         <p:spPr/>
         <p:txBody>
-          <a:bodyPr/>
+          <a:bodyPr>
+            <a:normAutofit fontScale="90000"/>
+          </a:bodyPr>
           <a:lstStyle/>
           <a:p>
             <a:r>
@@ -35746,7 +36285,7 @@
 </p:sld>
 </file>
 
-<file path=ppt/slides/slide61.xml><?xml version="1.0" encoding="utf-8"?>
+<file path=ppt/slides/slide62.xml><?xml version="1.0" encoding="utf-8"?>
 <p:sld xmlns:a="http://schemas.openxmlformats.org/drawingml/2006/main" xmlns:r="http://schemas.openxmlformats.org/officeDocument/2006/relationships" xmlns:p="http://schemas.openxmlformats.org/presentationml/2006/main">
   <p:cSld>
     <p:spTree>
@@ -36283,7 +36822,7 @@
 </p:sld>
 </file>
 
-<file path=ppt/slides/slide62.xml><?xml version="1.0" encoding="utf-8"?>
+<file path=ppt/slides/slide63.xml><?xml version="1.0" encoding="utf-8"?>
 <p:sld xmlns:a="http://schemas.openxmlformats.org/drawingml/2006/main" xmlns:r="http://schemas.openxmlformats.org/officeDocument/2006/relationships" xmlns:p="http://schemas.openxmlformats.org/presentationml/2006/main">
   <p:cSld>
     <p:spTree>
@@ -36319,7 +36858,7 @@
         <p:spPr/>
         <p:txBody>
           <a:bodyPr>
-            <a:normAutofit/>
+            <a:normAutofit fontScale="90000"/>
           </a:bodyPr>
           <a:lstStyle/>
           <a:p>
@@ -36373,7 +36912,7 @@
 </p:sld>
 </file>
 
-<file path=ppt/slides/slide63.xml><?xml version="1.0" encoding="utf-8"?>
+<file path=ppt/slides/slide64.xml><?xml version="1.0" encoding="utf-8"?>
 <p:sld xmlns:a="http://schemas.openxmlformats.org/drawingml/2006/main" xmlns:r="http://schemas.openxmlformats.org/officeDocument/2006/relationships" xmlns:p="http://schemas.openxmlformats.org/presentationml/2006/main">
   <p:cSld>
     <p:spTree>
@@ -36409,7 +36948,7 @@
         <p:spPr/>
         <p:txBody>
           <a:bodyPr>
-            <a:normAutofit/>
+            <a:normAutofit fontScale="90000"/>
           </a:bodyPr>
           <a:lstStyle/>
           <a:p>
@@ -36499,7 +37038,7 @@
 </p:sld>
 </file>
 
-<file path=ppt/slides/slide64.xml><?xml version="1.0" encoding="utf-8"?>
+<file path=ppt/slides/slide65.xml><?xml version="1.0" encoding="utf-8"?>
 <p:sld xmlns:a="http://schemas.openxmlformats.org/drawingml/2006/main" xmlns:r="http://schemas.openxmlformats.org/officeDocument/2006/relationships" xmlns:p="http://schemas.openxmlformats.org/presentationml/2006/main">
   <p:cSld>
     <p:spTree>
@@ -38303,7 +38842,7 @@
 </p:sld>
 </file>
 
-<file path=ppt/slides/slide65.xml><?xml version="1.0" encoding="utf-8"?>
+<file path=ppt/slides/slide66.xml><?xml version="1.0" encoding="utf-8"?>
 <p:sld xmlns:a="http://schemas.openxmlformats.org/drawingml/2006/main" xmlns:r="http://schemas.openxmlformats.org/officeDocument/2006/relationships" xmlns:p="http://schemas.openxmlformats.org/presentationml/2006/main">
   <p:cSld>
     <p:spTree>
@@ -38577,7 +39116,7 @@
 </p:sld>
 </file>
 
-<file path=ppt/slides/slide66.xml><?xml version="1.0" encoding="utf-8"?>
+<file path=ppt/slides/slide67.xml><?xml version="1.0" encoding="utf-8"?>
 <p:sld xmlns:a="http://schemas.openxmlformats.org/drawingml/2006/main" xmlns:r="http://schemas.openxmlformats.org/officeDocument/2006/relationships" xmlns:p="http://schemas.openxmlformats.org/presentationml/2006/main">
   <p:cSld>
     <p:spTree>
@@ -42221,8 +42760,8 @@
         </p:nvSpPr>
         <p:spPr>
           <a:xfrm>
-            <a:off x="1331090" y="124362"/>
-            <a:ext cx="3932237" cy="726312"/>
+            <a:off x="2045465" y="219612"/>
+            <a:ext cx="6060310" cy="726312"/>
           </a:xfrm>
         </p:spPr>
         <p:txBody>
@@ -42232,16 +42771,40 @@
           <a:lstStyle/>
           <a:p>
             <a:r>
+              <a:rPr lang="en-IN" b="0" i="0" dirty="0" smtClean="0">
+                <a:effectLst/>
+              </a:rPr>
+              <a:t/>
+            </a:r>
+            <a:br>
+              <a:rPr lang="en-IN" b="0" i="0" dirty="0" smtClean="0">
+                <a:effectLst/>
+              </a:rPr>
+            </a:br>
+            <a:r>
+              <a:rPr lang="en-IN" sz="2700" b="0" i="0" dirty="0" smtClean="0">
+                <a:effectLst/>
+              </a:rPr>
+              <a:t>Numeric</a:t>
+            </a:r>
+            <a:r>
+              <a:rPr lang="en-IN" b="0" i="0" dirty="0" smtClean="0">
+                <a:effectLst/>
+              </a:rPr>
+              <a:t> </a:t>
+            </a:r>
+            <a:r>
               <a:rPr lang="en-IN" b="0" i="0" dirty="0">
                 <a:effectLst/>
               </a:rPr>
-              <a:t>Numeric Data Types</a:t>
-            </a:r>
-            <a:br>
-              <a:rPr lang="en-IN" b="0" i="0" dirty="0">
-                <a:effectLst/>
-              </a:rPr>
-            </a:br>
+              <a:t>Data </a:t>
+            </a:r>
+            <a:r>
+              <a:rPr lang="en-IN" b="0" i="0" dirty="0" smtClean="0">
+                <a:effectLst/>
+              </a:rPr>
+              <a:t>Types</a:t>
+            </a:r>
             <a:endParaRPr lang="en-IN" dirty="0"/>
           </a:p>
         </p:txBody>
@@ -44419,8 +44982,8 @@
         </p:nvSpPr>
         <p:spPr>
           <a:xfrm>
-            <a:off x="1219200" y="838200"/>
-            <a:ext cx="10363200" cy="396240"/>
+            <a:off x="1219200" y="466725"/>
+            <a:ext cx="5734050" cy="767715"/>
           </a:xfrm>
         </p:spPr>
         <p:txBody>
@@ -44437,24 +45000,18 @@
                 <a:effectLst/>
                 <a:latin typeface="Segoe UI" panose="020B0502040204020203" pitchFamily="34" charset="0"/>
               </a:rPr>
-              <a:t>Date and Time Data Types</a:t>
-            </a:r>
-            <a:br>
-              <a:rPr lang="en-US" b="0" i="0" dirty="0">
+              <a:t>Date and Time Data </a:t>
+            </a:r>
+            <a:r>
+              <a:rPr lang="en-US" b="0" i="0" dirty="0" smtClean="0">
                 <a:solidFill>
                   <a:srgbClr val="000000"/>
                 </a:solidFill>
                 <a:effectLst/>
                 <a:latin typeface="Segoe UI" panose="020B0502040204020203" pitchFamily="34" charset="0"/>
               </a:rPr>
-            </a:br>
-            <a:r>
-              <a:rPr lang="en-US" dirty="0"/>
-              <a:t/>
-            </a:r>
-            <a:br>
-              <a:rPr lang="en-US" dirty="0"/>
-            </a:br>
+              <a:t>Types</a:t>
+            </a:r>
             <a:endParaRPr lang="en-IN" dirty="0"/>
           </a:p>
         </p:txBody>

</xml_diff>